<commit_message>
Updated pptx, readme, notebook and tableau workbook.
</commit_message>
<xml_diff>
--- a/Predication Model for Heart Failure.pptx
+++ b/Predication Model for Heart Failure.pptx
@@ -4,6 +4,9 @@
   <p:sldMasterIdLst>
     <p:sldMasterId id="2147483648" r:id="rId1"/>
   </p:sldMasterIdLst>
+  <p:notesMasterIdLst>
+    <p:notesMasterId r:id="rId11"/>
+  </p:notesMasterIdLst>
   <p:sldIdLst>
     <p:sldId id="256" r:id="rId2"/>
     <p:sldId id="257" r:id="rId3"/>
@@ -19,32 +22,25 @@
   <p:notesSz cx="6858000" cy="9144000"/>
   <p:embeddedFontLst>
     <p:embeddedFont>
-      <p:font typeface="Calibri" panose="020F0502020204030204" pitchFamily="34" charset="0"/>
-      <p:regular r:id="rId11"/>
-      <p:bold r:id="rId12"/>
-      <p:italic r:id="rId13"/>
-      <p:boldItalic r:id="rId14"/>
-    </p:embeddedFont>
-    <p:embeddedFont>
       <p:font typeface="League Spartan" panose="020B0604020202020204" charset="0"/>
-      <p:regular r:id="rId15"/>
+      <p:regular r:id="rId12"/>
     </p:embeddedFont>
     <p:embeddedFont>
       <p:font typeface="Libre Baskerville Bold" panose="020B0604020202020204" charset="0"/>
-      <p:regular r:id="rId16"/>
+      <p:regular r:id="rId13"/>
     </p:embeddedFont>
     <p:embeddedFont>
       <p:font typeface="Libre Baskerville Italics" panose="020B0604020202020204" charset="0"/>
-      <p:regular r:id="rId17"/>
+      <p:regular r:id="rId14"/>
     </p:embeddedFont>
     <p:embeddedFont>
       <p:font typeface="Montserrat Light" panose="00000400000000000000" pitchFamily="2" charset="0"/>
-      <p:regular r:id="rId18"/>
-      <p:italic r:id="rId19"/>
+      <p:regular r:id="rId15"/>
+      <p:italic r:id="rId16"/>
     </p:embeddedFont>
     <p:embeddedFont>
       <p:font typeface="Montserrat Light Bold" panose="020B0604020202020204" charset="0"/>
-      <p:regular r:id="rId20"/>
+      <p:regular r:id="rId17"/>
     </p:embeddedFont>
   </p:embeddedFontLst>
   <p:defaultTextStyle>
@@ -161,6 +157,440 @@
 </p:presentation>
 </file>
 
+<file path=ppt/notesMasters/notesMaster1.xml><?xml version="1.0" encoding="utf-8"?>
+<p:notesMaster xmlns:a="http://schemas.openxmlformats.org/drawingml/2006/main" xmlns:r="http://schemas.openxmlformats.org/officeDocument/2006/relationships" xmlns:p="http://schemas.openxmlformats.org/presentationml/2006/main">
+  <p:cSld>
+    <p:bg>
+      <p:bgRef idx="1001">
+        <a:schemeClr val="bg1"/>
+      </p:bgRef>
+    </p:bg>
+    <p:spTree>
+      <p:nvGrpSpPr>
+        <p:cNvPr id="1" name=""/>
+        <p:cNvGrpSpPr/>
+        <p:nvPr/>
+      </p:nvGrpSpPr>
+      <p:grpSpPr>
+        <a:xfrm>
+          <a:off x="0" y="0"/>
+          <a:ext cx="0" cy="0"/>
+          <a:chOff x="0" y="0"/>
+          <a:chExt cx="0" cy="0"/>
+        </a:xfrm>
+      </p:grpSpPr>
+      <p:sp>
+        <p:nvSpPr>
+          <p:cNvPr id="2" name="Header Placeholder 1"/>
+          <p:cNvSpPr>
+            <a:spLocks noGrp="1"/>
+          </p:cNvSpPr>
+          <p:nvPr>
+            <p:ph type="hdr" sz="quarter"/>
+          </p:nvPr>
+        </p:nvSpPr>
+        <p:spPr>
+          <a:xfrm>
+            <a:off x="0" y="0"/>
+            <a:ext cx="2971800" cy="458788"/>
+          </a:xfrm>
+          <a:prstGeom prst="rect">
+            <a:avLst/>
+          </a:prstGeom>
+        </p:spPr>
+        <p:txBody>
+          <a:bodyPr vert="horz" lIns="91440" tIns="45720" rIns="91440" bIns="45720" rtlCol="0"/>
+          <a:lstStyle>
+            <a:lvl1pPr algn="l">
+              <a:defRPr sz="1200"/>
+            </a:lvl1pPr>
+          </a:lstStyle>
+          <a:p>
+            <a:endParaRPr lang="en-CA"/>
+          </a:p>
+        </p:txBody>
+      </p:sp>
+      <p:sp>
+        <p:nvSpPr>
+          <p:cNvPr id="3" name="Date Placeholder 2"/>
+          <p:cNvSpPr>
+            <a:spLocks noGrp="1"/>
+          </p:cNvSpPr>
+          <p:nvPr>
+            <p:ph type="dt" idx="1"/>
+          </p:nvPr>
+        </p:nvSpPr>
+        <p:spPr>
+          <a:xfrm>
+            <a:off x="3884613" y="0"/>
+            <a:ext cx="2971800" cy="458788"/>
+          </a:xfrm>
+          <a:prstGeom prst="rect">
+            <a:avLst/>
+          </a:prstGeom>
+        </p:spPr>
+        <p:txBody>
+          <a:bodyPr vert="horz" lIns="91440" tIns="45720" rIns="91440" bIns="45720" rtlCol="0"/>
+          <a:lstStyle>
+            <a:lvl1pPr algn="r">
+              <a:defRPr sz="1200"/>
+            </a:lvl1pPr>
+          </a:lstStyle>
+          <a:p>
+            <a:fld id="{F4D6DFA5-5CC4-443B-8E78-062E88CDF5B2}" type="datetimeFigureOut">
+              <a:rPr lang="en-CA" smtClean="0"/>
+              <a:t>2024-01-10</a:t>
+            </a:fld>
+            <a:endParaRPr lang="en-CA"/>
+          </a:p>
+        </p:txBody>
+      </p:sp>
+      <p:sp>
+        <p:nvSpPr>
+          <p:cNvPr id="4" name="Slide Image Placeholder 3"/>
+          <p:cNvSpPr>
+            <a:spLocks noGrp="1" noRot="1" noChangeAspect="1"/>
+          </p:cNvSpPr>
+          <p:nvPr>
+            <p:ph type="sldImg" idx="2"/>
+          </p:nvPr>
+        </p:nvSpPr>
+        <p:spPr>
+          <a:xfrm>
+            <a:off x="1371600" y="1143000"/>
+            <a:ext cx="4114800" cy="3086100"/>
+          </a:xfrm>
+          <a:prstGeom prst="rect">
+            <a:avLst/>
+          </a:prstGeom>
+          <a:noFill/>
+          <a:ln w="12700">
+            <a:solidFill>
+              <a:prstClr val="black"/>
+            </a:solidFill>
+          </a:ln>
+        </p:spPr>
+        <p:txBody>
+          <a:bodyPr vert="horz" lIns="91440" tIns="45720" rIns="91440" bIns="45720" rtlCol="0" anchor="ctr"/>
+          <a:lstStyle/>
+          <a:p>
+            <a:endParaRPr lang="en-CA"/>
+          </a:p>
+        </p:txBody>
+      </p:sp>
+      <p:sp>
+        <p:nvSpPr>
+          <p:cNvPr id="5" name="Notes Placeholder 4"/>
+          <p:cNvSpPr>
+            <a:spLocks noGrp="1"/>
+          </p:cNvSpPr>
+          <p:nvPr>
+            <p:ph type="body" sz="quarter" idx="3"/>
+          </p:nvPr>
+        </p:nvSpPr>
+        <p:spPr>
+          <a:xfrm>
+            <a:off x="685800" y="4400550"/>
+            <a:ext cx="5486400" cy="3600450"/>
+          </a:xfrm>
+          <a:prstGeom prst="rect">
+            <a:avLst/>
+          </a:prstGeom>
+        </p:spPr>
+        <p:txBody>
+          <a:bodyPr vert="horz" lIns="91440" tIns="45720" rIns="91440" bIns="45720" rtlCol="0"/>
+          <a:lstStyle/>
+          <a:p>
+            <a:pPr lvl="0"/>
+            <a:r>
+              <a:rPr lang="en-US"/>
+              <a:t>Click to edit Master text styles</a:t>
+            </a:r>
+          </a:p>
+          <a:p>
+            <a:pPr lvl="1"/>
+            <a:r>
+              <a:rPr lang="en-US"/>
+              <a:t>Second level</a:t>
+            </a:r>
+          </a:p>
+          <a:p>
+            <a:pPr lvl="2"/>
+            <a:r>
+              <a:rPr lang="en-US"/>
+              <a:t>Third level</a:t>
+            </a:r>
+          </a:p>
+          <a:p>
+            <a:pPr lvl="3"/>
+            <a:r>
+              <a:rPr lang="en-US"/>
+              <a:t>Fourth level</a:t>
+            </a:r>
+          </a:p>
+          <a:p>
+            <a:pPr lvl="4"/>
+            <a:r>
+              <a:rPr lang="en-US"/>
+              <a:t>Fifth level</a:t>
+            </a:r>
+            <a:endParaRPr lang="en-CA"/>
+          </a:p>
+        </p:txBody>
+      </p:sp>
+      <p:sp>
+        <p:nvSpPr>
+          <p:cNvPr id="6" name="Footer Placeholder 5"/>
+          <p:cNvSpPr>
+            <a:spLocks noGrp="1"/>
+          </p:cNvSpPr>
+          <p:nvPr>
+            <p:ph type="ftr" sz="quarter" idx="4"/>
+          </p:nvPr>
+        </p:nvSpPr>
+        <p:spPr>
+          <a:xfrm>
+            <a:off x="0" y="8685213"/>
+            <a:ext cx="2971800" cy="458787"/>
+          </a:xfrm>
+          <a:prstGeom prst="rect">
+            <a:avLst/>
+          </a:prstGeom>
+        </p:spPr>
+        <p:txBody>
+          <a:bodyPr vert="horz" lIns="91440" tIns="45720" rIns="91440" bIns="45720" rtlCol="0" anchor="b"/>
+          <a:lstStyle>
+            <a:lvl1pPr algn="l">
+              <a:defRPr sz="1200"/>
+            </a:lvl1pPr>
+          </a:lstStyle>
+          <a:p>
+            <a:endParaRPr lang="en-CA"/>
+          </a:p>
+        </p:txBody>
+      </p:sp>
+      <p:sp>
+        <p:nvSpPr>
+          <p:cNvPr id="7" name="Slide Number Placeholder 6"/>
+          <p:cNvSpPr>
+            <a:spLocks noGrp="1"/>
+          </p:cNvSpPr>
+          <p:nvPr>
+            <p:ph type="sldNum" sz="quarter" idx="5"/>
+          </p:nvPr>
+        </p:nvSpPr>
+        <p:spPr>
+          <a:xfrm>
+            <a:off x="3884613" y="8685213"/>
+            <a:ext cx="2971800" cy="458787"/>
+          </a:xfrm>
+          <a:prstGeom prst="rect">
+            <a:avLst/>
+          </a:prstGeom>
+        </p:spPr>
+        <p:txBody>
+          <a:bodyPr vert="horz" lIns="91440" tIns="45720" rIns="91440" bIns="45720" rtlCol="0" anchor="b"/>
+          <a:lstStyle>
+            <a:lvl1pPr algn="r">
+              <a:defRPr sz="1200"/>
+            </a:lvl1pPr>
+          </a:lstStyle>
+          <a:p>
+            <a:fld id="{C3863CBE-AD22-4334-9DD3-8C3BA69B0537}" type="slidenum">
+              <a:rPr lang="en-CA" smtClean="0"/>
+              <a:t>‹#›</a:t>
+            </a:fld>
+            <a:endParaRPr lang="en-CA"/>
+          </a:p>
+        </p:txBody>
+      </p:sp>
+    </p:spTree>
+    <p:extLst>
+      <p:ext uri="{BB962C8B-B14F-4D97-AF65-F5344CB8AC3E}">
+        <p14:creationId xmlns:p14="http://schemas.microsoft.com/office/powerpoint/2010/main" val="2958913107"/>
+      </p:ext>
+    </p:extLst>
+  </p:cSld>
+  <p:clrMap bg1="lt1" tx1="dk1" bg2="lt2" tx2="dk2" accent1="accent1" accent2="accent2" accent3="accent3" accent4="accent4" accent5="accent5" accent6="accent6" hlink="hlink" folHlink="folHlink"/>
+  <p:notesStyle>
+    <a:lvl1pPr marL="0" algn="l" defTabSz="914400" rtl="0" eaLnBrk="1" latinLnBrk="0" hangingPunct="1">
+      <a:defRPr sz="1200" kern="1200">
+        <a:solidFill>
+          <a:schemeClr val="tx1"/>
+        </a:solidFill>
+        <a:latin typeface="+mn-lt"/>
+        <a:ea typeface="+mn-ea"/>
+        <a:cs typeface="+mn-cs"/>
+      </a:defRPr>
+    </a:lvl1pPr>
+    <a:lvl2pPr marL="457200" algn="l" defTabSz="914400" rtl="0" eaLnBrk="1" latinLnBrk="0" hangingPunct="1">
+      <a:defRPr sz="1200" kern="1200">
+        <a:solidFill>
+          <a:schemeClr val="tx1"/>
+        </a:solidFill>
+        <a:latin typeface="+mn-lt"/>
+        <a:ea typeface="+mn-ea"/>
+        <a:cs typeface="+mn-cs"/>
+      </a:defRPr>
+    </a:lvl2pPr>
+    <a:lvl3pPr marL="914400" algn="l" defTabSz="914400" rtl="0" eaLnBrk="1" latinLnBrk="0" hangingPunct="1">
+      <a:defRPr sz="1200" kern="1200">
+        <a:solidFill>
+          <a:schemeClr val="tx1"/>
+        </a:solidFill>
+        <a:latin typeface="+mn-lt"/>
+        <a:ea typeface="+mn-ea"/>
+        <a:cs typeface="+mn-cs"/>
+      </a:defRPr>
+    </a:lvl3pPr>
+    <a:lvl4pPr marL="1371600" algn="l" defTabSz="914400" rtl="0" eaLnBrk="1" latinLnBrk="0" hangingPunct="1">
+      <a:defRPr sz="1200" kern="1200">
+        <a:solidFill>
+          <a:schemeClr val="tx1"/>
+        </a:solidFill>
+        <a:latin typeface="+mn-lt"/>
+        <a:ea typeface="+mn-ea"/>
+        <a:cs typeface="+mn-cs"/>
+      </a:defRPr>
+    </a:lvl4pPr>
+    <a:lvl5pPr marL="1828800" algn="l" defTabSz="914400" rtl="0" eaLnBrk="1" latinLnBrk="0" hangingPunct="1">
+      <a:defRPr sz="1200" kern="1200">
+        <a:solidFill>
+          <a:schemeClr val="tx1"/>
+        </a:solidFill>
+        <a:latin typeface="+mn-lt"/>
+        <a:ea typeface="+mn-ea"/>
+        <a:cs typeface="+mn-cs"/>
+      </a:defRPr>
+    </a:lvl5pPr>
+    <a:lvl6pPr marL="2286000" algn="l" defTabSz="914400" rtl="0" eaLnBrk="1" latinLnBrk="0" hangingPunct="1">
+      <a:defRPr sz="1200" kern="1200">
+        <a:solidFill>
+          <a:schemeClr val="tx1"/>
+        </a:solidFill>
+        <a:latin typeface="+mn-lt"/>
+        <a:ea typeface="+mn-ea"/>
+        <a:cs typeface="+mn-cs"/>
+      </a:defRPr>
+    </a:lvl6pPr>
+    <a:lvl7pPr marL="2743200" algn="l" defTabSz="914400" rtl="0" eaLnBrk="1" latinLnBrk="0" hangingPunct="1">
+      <a:defRPr sz="1200" kern="1200">
+        <a:solidFill>
+          <a:schemeClr val="tx1"/>
+        </a:solidFill>
+        <a:latin typeface="+mn-lt"/>
+        <a:ea typeface="+mn-ea"/>
+        <a:cs typeface="+mn-cs"/>
+      </a:defRPr>
+    </a:lvl7pPr>
+    <a:lvl8pPr marL="3200400" algn="l" defTabSz="914400" rtl="0" eaLnBrk="1" latinLnBrk="0" hangingPunct="1">
+      <a:defRPr sz="1200" kern="1200">
+        <a:solidFill>
+          <a:schemeClr val="tx1"/>
+        </a:solidFill>
+        <a:latin typeface="+mn-lt"/>
+        <a:ea typeface="+mn-ea"/>
+        <a:cs typeface="+mn-cs"/>
+      </a:defRPr>
+    </a:lvl8pPr>
+    <a:lvl9pPr marL="3657600" algn="l" defTabSz="914400" rtl="0" eaLnBrk="1" latinLnBrk="0" hangingPunct="1">
+      <a:defRPr sz="1200" kern="1200">
+        <a:solidFill>
+          <a:schemeClr val="tx1"/>
+        </a:solidFill>
+        <a:latin typeface="+mn-lt"/>
+        <a:ea typeface="+mn-ea"/>
+        <a:cs typeface="+mn-cs"/>
+      </a:defRPr>
+    </a:lvl9pPr>
+  </p:notesStyle>
+</p:notesMaster>
+</file>
+
+<file path=ppt/notesSlides/notesSlide1.xml><?xml version="1.0" encoding="utf-8"?>
+<p:notes xmlns:a="http://schemas.openxmlformats.org/drawingml/2006/main" xmlns:r="http://schemas.openxmlformats.org/officeDocument/2006/relationships" xmlns:p="http://schemas.openxmlformats.org/presentationml/2006/main">
+  <p:cSld>
+    <p:spTree>
+      <p:nvGrpSpPr>
+        <p:cNvPr id="1" name=""/>
+        <p:cNvGrpSpPr/>
+        <p:nvPr/>
+      </p:nvGrpSpPr>
+      <p:grpSpPr>
+        <a:xfrm>
+          <a:off x="0" y="0"/>
+          <a:ext cx="0" cy="0"/>
+          <a:chOff x="0" y="0"/>
+          <a:chExt cx="0" cy="0"/>
+        </a:xfrm>
+      </p:grpSpPr>
+      <p:sp>
+        <p:nvSpPr>
+          <p:cNvPr id="2" name="Slide Image Placeholder 1"/>
+          <p:cNvSpPr>
+            <a:spLocks noGrp="1" noRot="1" noChangeAspect="1"/>
+          </p:cNvSpPr>
+          <p:nvPr>
+            <p:ph type="sldImg"/>
+          </p:nvPr>
+        </p:nvSpPr>
+        <p:spPr/>
+      </p:sp>
+      <p:sp>
+        <p:nvSpPr>
+          <p:cNvPr id="3" name="Notes Placeholder 2"/>
+          <p:cNvSpPr>
+            <a:spLocks noGrp="1"/>
+          </p:cNvSpPr>
+          <p:nvPr>
+            <p:ph type="body" idx="1"/>
+          </p:nvPr>
+        </p:nvSpPr>
+        <p:spPr/>
+        <p:txBody>
+          <a:bodyPr/>
+          <a:lstStyle/>
+          <a:p>
+            <a:endParaRPr lang="en-CA" dirty="0"/>
+          </a:p>
+        </p:txBody>
+      </p:sp>
+      <p:sp>
+        <p:nvSpPr>
+          <p:cNvPr id="4" name="Slide Number Placeholder 3"/>
+          <p:cNvSpPr>
+            <a:spLocks noGrp="1"/>
+          </p:cNvSpPr>
+          <p:nvPr>
+            <p:ph type="sldNum" sz="quarter" idx="5"/>
+          </p:nvPr>
+        </p:nvSpPr>
+        <p:spPr/>
+        <p:txBody>
+          <a:bodyPr/>
+          <a:lstStyle/>
+          <a:p>
+            <a:fld id="{C3863CBE-AD22-4334-9DD3-8C3BA69B0537}" type="slidenum">
+              <a:rPr lang="en-CA" smtClean="0"/>
+              <a:t>6</a:t>
+            </a:fld>
+            <a:endParaRPr lang="en-CA"/>
+          </a:p>
+        </p:txBody>
+      </p:sp>
+    </p:spTree>
+    <p:extLst>
+      <p:ext uri="{BB962C8B-B14F-4D97-AF65-F5344CB8AC3E}">
+        <p14:creationId xmlns:p14="http://schemas.microsoft.com/office/powerpoint/2010/main" val="2383449604"/>
+      </p:ext>
+    </p:extLst>
+  </p:cSld>
+  <p:clrMapOvr>
+    <a:masterClrMapping/>
+  </p:clrMapOvr>
+</p:notes>
+</file>
+
 <file path=ppt/slideLayouts/slideLayout1.xml><?xml version="1.0" encoding="utf-8"?>
 <p:sldLayout xmlns:a="http://schemas.openxmlformats.org/drawingml/2006/main" xmlns:r="http://schemas.openxmlformats.org/officeDocument/2006/relationships" xmlns:p="http://schemas.openxmlformats.org/presentationml/2006/main" type="title" preserve="1">
   <p:cSld name="Title Slide">
@@ -341,7 +771,7 @@
             <a:fld id="{1D8BD707-D9CF-40AE-B4C6-C98DA3205C09}" type="datetimeFigureOut">
               <a:rPr lang="en-US" smtClean="0"/>
               <a:pPr/>
-              <a:t>1/4/2024</a:t>
+              <a:t>1/9/2024</a:t>
             </a:fld>
             <a:endParaRPr lang="en-US"/>
           </a:p>
@@ -506,7 +936,7 @@
             <a:fld id="{1D8BD707-D9CF-40AE-B4C6-C98DA3205C09}" type="datetimeFigureOut">
               <a:rPr lang="en-US" smtClean="0"/>
               <a:pPr/>
-              <a:t>1/4/2024</a:t>
+              <a:t>1/9/2024</a:t>
             </a:fld>
             <a:endParaRPr lang="en-US"/>
           </a:p>
@@ -681,7 +1111,7 @@
             <a:fld id="{1D8BD707-D9CF-40AE-B4C6-C98DA3205C09}" type="datetimeFigureOut">
               <a:rPr lang="en-US" smtClean="0"/>
               <a:pPr/>
-              <a:t>1/4/2024</a:t>
+              <a:t>1/9/2024</a:t>
             </a:fld>
             <a:endParaRPr lang="en-US"/>
           </a:p>
@@ -846,7 +1276,7 @@
             <a:fld id="{1D8BD707-D9CF-40AE-B4C6-C98DA3205C09}" type="datetimeFigureOut">
               <a:rPr lang="en-US" smtClean="0"/>
               <a:pPr/>
-              <a:t>1/4/2024</a:t>
+              <a:t>1/9/2024</a:t>
             </a:fld>
             <a:endParaRPr lang="en-US"/>
           </a:p>
@@ -1088,7 +1518,7 @@
             <a:fld id="{1D8BD707-D9CF-40AE-B4C6-C98DA3205C09}" type="datetimeFigureOut">
               <a:rPr lang="en-US" smtClean="0"/>
               <a:pPr/>
-              <a:t>1/4/2024</a:t>
+              <a:t>1/9/2024</a:t>
             </a:fld>
             <a:endParaRPr lang="en-US"/>
           </a:p>
@@ -1370,7 +1800,7 @@
             <a:fld id="{1D8BD707-D9CF-40AE-B4C6-C98DA3205C09}" type="datetimeFigureOut">
               <a:rPr lang="en-US" smtClean="0"/>
               <a:pPr/>
-              <a:t>1/4/2024</a:t>
+              <a:t>1/9/2024</a:t>
             </a:fld>
             <a:endParaRPr lang="en-US"/>
           </a:p>
@@ -1786,7 +2216,7 @@
             <a:fld id="{1D8BD707-D9CF-40AE-B4C6-C98DA3205C09}" type="datetimeFigureOut">
               <a:rPr lang="en-US" smtClean="0"/>
               <a:pPr/>
-              <a:t>1/4/2024</a:t>
+              <a:t>1/9/2024</a:t>
             </a:fld>
             <a:endParaRPr lang="en-US"/>
           </a:p>
@@ -1900,7 +2330,7 @@
             <a:fld id="{1D8BD707-D9CF-40AE-B4C6-C98DA3205C09}" type="datetimeFigureOut">
               <a:rPr lang="en-US" smtClean="0"/>
               <a:pPr/>
-              <a:t>1/4/2024</a:t>
+              <a:t>1/9/2024</a:t>
             </a:fld>
             <a:endParaRPr lang="en-US"/>
           </a:p>
@@ -1992,7 +2422,7 @@
             <a:fld id="{1D8BD707-D9CF-40AE-B4C6-C98DA3205C09}" type="datetimeFigureOut">
               <a:rPr lang="en-US" smtClean="0"/>
               <a:pPr/>
-              <a:t>1/4/2024</a:t>
+              <a:t>1/9/2024</a:t>
             </a:fld>
             <a:endParaRPr lang="en-US"/>
           </a:p>
@@ -2264,7 +2694,7 @@
             <a:fld id="{1D8BD707-D9CF-40AE-B4C6-C98DA3205C09}" type="datetimeFigureOut">
               <a:rPr lang="en-US" smtClean="0"/>
               <a:pPr/>
-              <a:t>1/4/2024</a:t>
+              <a:t>1/9/2024</a:t>
             </a:fld>
             <a:endParaRPr lang="en-US"/>
           </a:p>
@@ -2513,7 +2943,7 @@
             <a:fld id="{1D8BD707-D9CF-40AE-B4C6-C98DA3205C09}" type="datetimeFigureOut">
               <a:rPr lang="en-US" smtClean="0"/>
               <a:pPr/>
-              <a:t>1/4/2024</a:t>
+              <a:t>1/9/2024</a:t>
             </a:fld>
             <a:endParaRPr lang="en-US"/>
           </a:p>
@@ -2721,7 +3151,7 @@
             <a:fld id="{1D8BD707-D9CF-40AE-B4C6-C98DA3205C09}" type="datetimeFigureOut">
               <a:rPr lang="en-US" smtClean="0"/>
               <a:pPr/>
-              <a:t>1/4/2024</a:t>
+              <a:t>1/9/2024</a:t>
             </a:fld>
             <a:endParaRPr lang="en-US"/>
           </a:p>
@@ -3213,7 +3643,7 @@
                 </a:lnSpc>
               </a:pPr>
               <a:r>
-                <a:rPr lang="en-US" sz="4500">
+                <a:rPr lang="en-US" sz="4500" dirty="0">
                   <a:solidFill>
                     <a:srgbClr val="5271FF"/>
                   </a:solidFill>
@@ -3429,7 +3859,7 @@
           <p:spPr>
             <a:xfrm>
               <a:off x="0" y="1498624"/>
-              <a:ext cx="9669980" cy="3200400"/>
+              <a:ext cx="9669980" cy="3282950"/>
             </a:xfrm>
             <a:prstGeom prst="rect">
               <a:avLst/>
@@ -3447,7 +3877,7 @@
                 </a:lnSpc>
               </a:pPr>
               <a:r>
-                <a:rPr lang="en-US" sz="3975">
+                <a:rPr lang="en-US" sz="3600" dirty="0">
                   <a:solidFill>
                     <a:srgbClr val="FFFFFF"/>
                   </a:solidFill>
@@ -4019,7 +4449,7 @@
                 </a:lnSpc>
               </a:pPr>
               <a:r>
-                <a:rPr lang="en-US" sz="1499" spc="224">
+                <a:rPr lang="en-US" sz="1499" spc="224" dirty="0">
                   <a:solidFill>
                     <a:srgbClr val="FFFFFF"/>
                   </a:solidFill>
@@ -4040,7 +4470,7 @@
         <p:spPr>
           <a:xfrm>
             <a:off x="731520" y="4756779"/>
-            <a:ext cx="2555208" cy="581025"/>
+            <a:ext cx="2555208" cy="605550"/>
           </a:xfrm>
           <a:prstGeom prst="rect">
             <a:avLst/>
@@ -4058,7 +4488,7 @@
               </a:lnSpc>
             </a:pPr>
             <a:r>
-              <a:rPr lang="en-US" sz="1999">
+              <a:rPr lang="en-US" sz="1999" dirty="0">
                 <a:solidFill>
                   <a:srgbClr val="FFFFFF"/>
                 </a:solidFill>
@@ -4096,7 +4526,7 @@
               </a:lnSpc>
             </a:pPr>
             <a:r>
-              <a:rPr lang="en-US" sz="1999">
+              <a:rPr lang="en-US" sz="1999" dirty="0">
                 <a:solidFill>
                   <a:srgbClr val="FFFFFF"/>
                 </a:solidFill>
@@ -4178,8 +4608,8 @@
         </p:nvSpPr>
         <p:spPr>
           <a:xfrm>
-            <a:off x="5874634" y="-923971"/>
-            <a:ext cx="7757932" cy="9163142"/>
+            <a:off x="6858000" y="228600"/>
+            <a:ext cx="6614932" cy="7375272"/>
           </a:xfrm>
           <a:custGeom>
             <a:avLst/>
@@ -4232,9 +4662,9 @@
         <p:grpSpPr>
           <a:xfrm>
             <a:off x="-490006" y="462326"/>
-            <a:ext cx="6040959" cy="5274899"/>
+            <a:ext cx="6128806" cy="5389667"/>
             <a:chOff x="0" y="0"/>
-            <a:chExt cx="8054612" cy="7033199"/>
+            <a:chExt cx="8171741" cy="7186223"/>
           </a:xfrm>
         </p:grpSpPr>
         <p:sp>
@@ -4321,7 +4751,7 @@
                 </a:lnSpc>
               </a:pPr>
               <a:r>
-                <a:rPr lang="en-US" sz="2099">
+                <a:rPr lang="en-US" sz="2099" dirty="0">
                   <a:solidFill>
                     <a:srgbClr val="5271FF"/>
                   </a:solidFill>
@@ -4337,7 +4767,7 @@
                 </a:lnSpc>
               </a:pPr>
               <a:r>
-                <a:rPr lang="en-US" sz="2099">
+                <a:rPr lang="en-US" sz="2099" dirty="0">
                   <a:solidFill>
                     <a:srgbClr val="5271FF"/>
                   </a:solidFill>
@@ -4356,8 +4786,8 @@
           </p:nvSpPr>
           <p:spPr>
             <a:xfrm>
-              <a:off x="1300704" y="3778823"/>
-              <a:ext cx="6023144" cy="3254375"/>
+              <a:off x="2148597" y="4022964"/>
+              <a:ext cx="6023144" cy="3163259"/>
             </a:xfrm>
             <a:prstGeom prst="rect">
               <a:avLst/>
@@ -4369,101 +4799,83 @@
             </a:bodyPr>
             <a:lstStyle/>
             <a:p>
-              <a:pPr>
-                <a:lnSpc>
-                  <a:spcPts val="1575"/>
-                </a:lnSpc>
-              </a:pPr>
-              <a:endParaRPr/>
-            </a:p>
-            <a:p>
-              <a:pPr marL="399411" lvl="1" indent="-199705">
+              <a:pPr marL="199706" lvl="1">
                 <a:lnSpc>
                   <a:spcPts val="2774"/>
                 </a:lnSpc>
-                <a:buFont typeface="Arial"/>
-                <a:buChar char="•"/>
               </a:pPr>
               <a:r>
-                <a:rPr lang="en-US" sz="1849" spc="18">
+                <a:rPr lang="en-US" sz="2000" spc="18" dirty="0">
                   <a:solidFill>
                     <a:srgbClr val="000000"/>
                   </a:solidFill>
                   <a:latin typeface="Montserrat Light"/>
                 </a:rPr>
-                <a:t>Age</a:t>
+                <a:t>1. Age</a:t>
               </a:r>
             </a:p>
             <a:p>
-              <a:pPr marL="399411" lvl="1" indent="-199705">
+              <a:pPr marL="199706" lvl="1">
                 <a:lnSpc>
                   <a:spcPts val="2774"/>
                 </a:lnSpc>
-                <a:buFont typeface="Arial"/>
-                <a:buChar char="•"/>
               </a:pPr>
               <a:r>
-                <a:rPr lang="en-US" sz="1849" spc="18">
+                <a:rPr lang="en-US" sz="2000" spc="18" dirty="0">
                   <a:solidFill>
                     <a:srgbClr val="000000"/>
                   </a:solidFill>
                   <a:latin typeface="Montserrat Light"/>
                 </a:rPr>
-                <a:t>Sex</a:t>
+                <a:t>2. Sex</a:t>
               </a:r>
             </a:p>
             <a:p>
-              <a:pPr marL="399411" lvl="1" indent="-199705">
+              <a:pPr marL="199706" lvl="1">
                 <a:lnSpc>
                   <a:spcPts val="2774"/>
                 </a:lnSpc>
-                <a:buFont typeface="Arial"/>
-                <a:buChar char="•"/>
               </a:pPr>
               <a:r>
-                <a:rPr lang="en-US" sz="1849" spc="18">
+                <a:rPr lang="en-US" sz="2000" spc="18" dirty="0">
                   <a:solidFill>
                     <a:srgbClr val="000000"/>
                   </a:solidFill>
                   <a:latin typeface="Montserrat Light"/>
                 </a:rPr>
-                <a:t>Chest Pain Type</a:t>
+                <a:t>3. Chest Pain Type</a:t>
               </a:r>
             </a:p>
             <a:p>
-              <a:pPr marL="399411" lvl="1" indent="-199705">
+              <a:pPr marL="199706" lvl="1">
                 <a:lnSpc>
                   <a:spcPts val="2774"/>
                 </a:lnSpc>
-                <a:buFont typeface="Arial"/>
-                <a:buChar char="•"/>
               </a:pPr>
               <a:r>
-                <a:rPr lang="en-US" sz="1849" spc="18">
+                <a:rPr lang="en-US" sz="2000" spc="18" dirty="0">
                   <a:solidFill>
                     <a:srgbClr val="000000"/>
                   </a:solidFill>
                   <a:latin typeface="Montserrat Light"/>
                 </a:rPr>
-                <a:t>Resting BP</a:t>
+                <a:t>4. Resting BP</a:t>
               </a:r>
             </a:p>
             <a:p>
-              <a:pPr marL="399411" lvl="1" indent="-199705">
+              <a:pPr marL="199706" lvl="1">
                 <a:lnSpc>
                   <a:spcPts val="2774"/>
                 </a:lnSpc>
-                <a:buFont typeface="Arial"/>
-                <a:buChar char="•"/>
               </a:pPr>
               <a:r>
-                <a:rPr lang="en-US" sz="1849" spc="18">
+                <a:rPr lang="en-US" sz="2000" spc="18" dirty="0">
                   <a:solidFill>
                     <a:srgbClr val="000000"/>
                   </a:solidFill>
                   <a:latin typeface="Montserrat Light"/>
                 </a:rPr>
-                <a:t>Cholesterol</a:t>
+                <a:t>5. Cholesterol</a:t>
               </a:r>
             </a:p>
             <a:p>
@@ -4472,7 +4884,7 @@
                   <a:spcPts val="2324"/>
                 </a:lnSpc>
               </a:pPr>
-              <a:endParaRPr lang="en-US" sz="1849" spc="18">
+              <a:endParaRPr lang="en-US" sz="1849" spc="18" dirty="0">
                 <a:solidFill>
                   <a:srgbClr val="000000"/>
                 </a:solidFill>
@@ -4485,7 +4897,7 @@
                   <a:spcPts val="2174"/>
                 </a:lnSpc>
               </a:pPr>
-              <a:endParaRPr lang="en-US" sz="1849" spc="18">
+              <a:endParaRPr lang="en-US" sz="1849" spc="18" dirty="0">
                 <a:solidFill>
                   <a:srgbClr val="000000"/>
                 </a:solidFill>
@@ -4575,15 +4987,15 @@
         </p:nvSpPr>
         <p:spPr>
           <a:xfrm>
-            <a:off x="3063076" y="3438525"/>
-            <a:ext cx="2618105" cy="2044066"/>
+            <a:off x="4065427" y="3439326"/>
+            <a:ext cx="3173573" cy="2123274"/>
           </a:xfrm>
           <a:prstGeom prst="rect">
             <a:avLst/>
           </a:prstGeom>
         </p:spPr>
         <p:txBody>
-          <a:bodyPr lIns="0" tIns="0" rIns="0" bIns="0" rtlCol="0" anchor="t">
+          <a:bodyPr wrap="square" lIns="0" tIns="0" rIns="0" bIns="0" rtlCol="0" anchor="t">
             <a:spAutoFit/>
           </a:bodyPr>
           <a:lstStyle/>
@@ -4597,7 +5009,7 @@
               </a:spcBef>
             </a:pPr>
             <a:r>
-              <a:rPr lang="en-US" sz="1849" spc="18">
+              <a:rPr lang="en-US" sz="2000" spc="18" dirty="0">
                 <a:solidFill>
                   <a:srgbClr val="000000"/>
                 </a:solidFill>
@@ -4616,7 +5028,7 @@
               </a:spcBef>
             </a:pPr>
             <a:r>
-              <a:rPr lang="en-US" sz="1849" spc="18">
+              <a:rPr lang="en-US" sz="2000" spc="18" dirty="0">
                 <a:solidFill>
                   <a:srgbClr val="000000"/>
                 </a:solidFill>
@@ -4635,7 +5047,7 @@
               </a:spcBef>
             </a:pPr>
             <a:r>
-              <a:rPr lang="en-US" sz="1849" spc="18">
+              <a:rPr lang="en-US" sz="2000" spc="18" dirty="0">
                 <a:solidFill>
                   <a:srgbClr val="000000"/>
                 </a:solidFill>
@@ -4654,7 +5066,7 @@
               </a:spcBef>
             </a:pPr>
             <a:r>
-              <a:rPr lang="en-US" sz="1849" spc="18">
+              <a:rPr lang="en-US" sz="2000" spc="18" dirty="0">
                 <a:solidFill>
                   <a:srgbClr val="000000"/>
                 </a:solidFill>
@@ -4673,7 +5085,7 @@
               </a:spcBef>
             </a:pPr>
             <a:r>
-              <a:rPr lang="en-US" sz="1849" spc="18">
+              <a:rPr lang="en-US" sz="2000" spc="18" dirty="0">
                 <a:solidFill>
                   <a:srgbClr val="000000"/>
                 </a:solidFill>
@@ -4692,7 +5104,7 @@
               </a:spcBef>
             </a:pPr>
             <a:r>
-              <a:rPr lang="en-US" sz="1849" spc="18">
+              <a:rPr lang="en-US" sz="2000" spc="18" dirty="0">
                 <a:solidFill>
                   <a:srgbClr val="000000"/>
                 </a:solidFill>
@@ -5106,7 +5518,7 @@
         </p:nvSpPr>
         <p:spPr>
           <a:xfrm>
-            <a:off x="7154540" y="3644797"/>
+            <a:off x="7154539" y="3653772"/>
             <a:ext cx="2091682" cy="803340"/>
           </a:xfrm>
           <a:prstGeom prst="rect">
@@ -5116,6 +5528,13 @@
             <a:srgbClr val="5271FF"/>
           </a:solidFill>
         </p:spPr>
+        <p:txBody>
+          <a:bodyPr/>
+          <a:lstStyle/>
+          <a:p>
+            <a:endParaRPr lang="en-CA" dirty="0"/>
+          </a:p>
+        </p:txBody>
       </p:sp>
       <p:sp>
         <p:nvSpPr>
@@ -5125,7 +5544,7 @@
         </p:nvSpPr>
         <p:spPr>
           <a:xfrm>
-            <a:off x="7154540" y="4549242"/>
+            <a:off x="7154539" y="4576161"/>
             <a:ext cx="2091682" cy="799821"/>
           </a:xfrm>
           <a:prstGeom prst="rect">
@@ -5163,7 +5582,7 @@
         </p:nvSpPr>
         <p:spPr>
           <a:xfrm>
-            <a:off x="3551681" y="3644797"/>
+            <a:off x="3298340" y="3735016"/>
             <a:ext cx="3487740" cy="2266295"/>
           </a:xfrm>
           <a:custGeom>
@@ -5194,55 +5613,9 @@
             </a:pathLst>
           </a:custGeom>
           <a:blipFill>
-            <a:blip r:embed="rId2"/>
+            <a:blip r:embed="rId3"/>
             <a:stretch>
               <a:fillRect/>
-            </a:stretch>
-          </a:blipFill>
-        </p:spPr>
-      </p:sp>
-      <p:sp>
-        <p:nvSpPr>
-          <p:cNvPr id="9" name="Freeform 9"/>
-          <p:cNvSpPr/>
-          <p:nvPr/>
-        </p:nvSpPr>
-        <p:spPr>
-          <a:xfrm>
-            <a:off x="485522" y="3582904"/>
-            <a:ext cx="2942334" cy="2229739"/>
-          </a:xfrm>
-          <a:custGeom>
-            <a:avLst/>
-            <a:gdLst/>
-            <a:ahLst/>
-            <a:cxnLst/>
-            <a:rect l="l" t="t" r="r" b="b"/>
-            <a:pathLst>
-              <a:path w="2942334" h="2229739">
-                <a:moveTo>
-                  <a:pt x="0" y="0"/>
-                </a:moveTo>
-                <a:lnTo>
-                  <a:pt x="2942334" y="0"/>
-                </a:lnTo>
-                <a:lnTo>
-                  <a:pt x="2942334" y="2229740"/>
-                </a:lnTo>
-                <a:lnTo>
-                  <a:pt x="0" y="2229740"/>
-                </a:lnTo>
-                <a:lnTo>
-                  <a:pt x="0" y="0"/>
-                </a:lnTo>
-                <a:close/>
-              </a:path>
-            </a:pathLst>
-          </a:custGeom>
-          <a:blipFill>
-            <a:blip r:embed="rId3"/>
-            <a:stretch>
-              <a:fillRect l="-5892" r="-5892"/>
             </a:stretch>
           </a:blipFill>
         </p:spPr>
@@ -5435,7 +5808,7 @@
         </p:nvSpPr>
         <p:spPr>
           <a:xfrm>
-            <a:off x="614724" y="3262303"/>
+            <a:off x="1450712" y="3217975"/>
             <a:ext cx="2559613" cy="320601"/>
           </a:xfrm>
           <a:prstGeom prst="rect">
@@ -5454,7 +5827,7 @@
               </a:lnSpc>
             </a:pPr>
             <a:r>
-              <a:rPr lang="en-US" sz="2054">
+              <a:rPr lang="en-US" sz="2054" dirty="0">
                 <a:solidFill>
                   <a:srgbClr val="5B79FF"/>
                 </a:solidFill>
@@ -5462,12 +5835,6 @@
               </a:rPr>
               <a:t>SVM</a:t>
             </a:r>
-            <a:endParaRPr lang="en-US" sz="2054" dirty="0">
-              <a:solidFill>
-                <a:srgbClr val="5B79FF"/>
-              </a:solidFill>
-              <a:latin typeface="League Spartan Bold"/>
-            </a:endParaRPr>
           </a:p>
         </p:txBody>
       </p:sp>
@@ -5479,7 +5846,7 @@
         </p:nvSpPr>
         <p:spPr>
           <a:xfrm>
-            <a:off x="4035916" y="3269074"/>
+            <a:off x="3737466" y="3217974"/>
             <a:ext cx="2669684" cy="320601"/>
           </a:xfrm>
           <a:prstGeom prst="rect">
@@ -5632,7 +5999,7 @@
                 </a:lnSpc>
               </a:pPr>
               <a:r>
-                <a:rPr lang="en-US" sz="1043" spc="10">
+                <a:rPr lang="en-US" sz="1043" spc="10" dirty="0">
                   <a:solidFill>
                     <a:srgbClr val="FFFFFF"/>
                   </a:solidFill>
@@ -5652,7 +6019,7 @@
         </p:nvGrpSpPr>
         <p:grpSpPr>
           <a:xfrm>
-            <a:off x="7353903" y="4782490"/>
+            <a:off x="7353902" y="4809409"/>
             <a:ext cx="1692955" cy="390925"/>
             <a:chOff x="0" y="9525"/>
             <a:chExt cx="2257274" cy="521233"/>
@@ -5828,50 +6195,6 @@
       </p:grpSp>
       <p:sp>
         <p:nvSpPr>
-          <p:cNvPr id="29" name="TextBox 14">
-            <a:extLst>
-              <a:ext uri="{FF2B5EF4-FFF2-40B4-BE49-F238E27FC236}">
-                <a16:creationId xmlns:a16="http://schemas.microsoft.com/office/drawing/2014/main" id="{1267B3DC-B171-B969-C9B8-9B207E1716FA}"/>
-              </a:ext>
-            </a:extLst>
-          </p:cNvPr>
-          <p:cNvSpPr txBox="1"/>
-          <p:nvPr/>
-        </p:nvSpPr>
-        <p:spPr>
-          <a:xfrm>
-            <a:off x="1219200" y="5886813"/>
-            <a:ext cx="2559613" cy="284822"/>
-          </a:xfrm>
-          <a:prstGeom prst="rect">
-            <a:avLst/>
-          </a:prstGeom>
-        </p:spPr>
-        <p:txBody>
-          <a:bodyPr wrap="square" lIns="0" tIns="0" rIns="0" bIns="0" rtlCol="0" anchor="t">
-            <a:spAutoFit/>
-          </a:bodyPr>
-          <a:lstStyle/>
-          <a:p>
-            <a:pPr algn="l">
-              <a:lnSpc>
-                <a:spcPts val="2464"/>
-              </a:lnSpc>
-            </a:pPr>
-            <a:r>
-              <a:rPr lang="en-US" sz="1400" b="1" dirty="0">
-                <a:latin typeface="Montserrat Light" panose="00000400000000000000" pitchFamily="2" charset="0"/>
-              </a:rPr>
-              <a:t>Hyperplane</a:t>
-            </a:r>
-            <a:endParaRPr lang="en-US" sz="2054" b="1" dirty="0">
-              <a:latin typeface="Montserrat Light" panose="00000400000000000000" pitchFamily="2" charset="0"/>
-            </a:endParaRPr>
-          </a:p>
-        </p:txBody>
-      </p:sp>
-      <p:sp>
-        <p:nvSpPr>
           <p:cNvPr id="31" name="TextBox 30">
             <a:extLst>
               <a:ext uri="{FF2B5EF4-FFF2-40B4-BE49-F238E27FC236}">
@@ -5884,7 +6207,7 @@
         </p:nvSpPr>
         <p:spPr>
           <a:xfrm>
-            <a:off x="4612577" y="5886813"/>
+            <a:off x="4135258" y="5909851"/>
             <a:ext cx="1516362" cy="378950"/>
           </a:xfrm>
           <a:prstGeom prst="rect">
@@ -5915,6 +6238,633 @@
           </a:p>
         </p:txBody>
       </p:sp>
+      <p:grpSp>
+        <p:nvGrpSpPr>
+          <p:cNvPr id="32" name="Group 17">
+            <a:extLst>
+              <a:ext uri="{FF2B5EF4-FFF2-40B4-BE49-F238E27FC236}">
+                <a16:creationId xmlns:a16="http://schemas.microsoft.com/office/drawing/2014/main" id="{A975D94E-D3A7-25BB-9C63-963F8BEE7C9E}"/>
+              </a:ext>
+            </a:extLst>
+          </p:cNvPr>
+          <p:cNvGrpSpPr/>
+          <p:nvPr/>
+        </p:nvGrpSpPr>
+        <p:grpSpPr>
+          <a:xfrm>
+            <a:off x="1621262" y="2730812"/>
+            <a:ext cx="1692955" cy="390981"/>
+            <a:chOff x="0" y="9525"/>
+            <a:chExt cx="2257274" cy="521308"/>
+          </a:xfrm>
+        </p:grpSpPr>
+        <p:sp>
+          <p:nvSpPr>
+            <p:cNvPr id="33" name="TextBox 18">
+              <a:extLst>
+                <a:ext uri="{FF2B5EF4-FFF2-40B4-BE49-F238E27FC236}">
+                  <a16:creationId xmlns:a16="http://schemas.microsoft.com/office/drawing/2014/main" id="{C66B8B9F-982C-7CF5-7E2C-1A2DD1122C7E}"/>
+                </a:ext>
+              </a:extLst>
+            </p:cNvPr>
+            <p:cNvSpPr txBox="1"/>
+            <p:nvPr/>
+          </p:nvSpPr>
+          <p:spPr>
+            <a:xfrm>
+              <a:off x="0" y="9525"/>
+              <a:ext cx="2257274" cy="307776"/>
+            </a:xfrm>
+            <a:prstGeom prst="rect">
+              <a:avLst/>
+            </a:prstGeom>
+          </p:spPr>
+          <p:txBody>
+            <a:bodyPr lIns="0" tIns="0" rIns="0" bIns="0" rtlCol="0" anchor="t">
+              <a:spAutoFit/>
+            </a:bodyPr>
+            <a:lstStyle/>
+            <a:p>
+              <a:pPr algn="ctr">
+                <a:lnSpc>
+                  <a:spcPts val="1785"/>
+                </a:lnSpc>
+              </a:pPr>
+              <a:r>
+                <a:rPr lang="en-US" sz="1487" dirty="0">
+                  <a:solidFill>
+                    <a:srgbClr val="FFFFFF"/>
+                  </a:solidFill>
+                  <a:latin typeface="League Spartan Bold"/>
+                </a:rPr>
+                <a:t>84.35%</a:t>
+              </a:r>
+            </a:p>
+          </p:txBody>
+        </p:sp>
+        <p:sp>
+          <p:nvSpPr>
+            <p:cNvPr id="34" name="TextBox 19">
+              <a:extLst>
+                <a:ext uri="{FF2B5EF4-FFF2-40B4-BE49-F238E27FC236}">
+                  <a16:creationId xmlns:a16="http://schemas.microsoft.com/office/drawing/2014/main" id="{152F128E-D70F-2615-C29B-5301BF6802EF}"/>
+                </a:ext>
+              </a:extLst>
+            </p:cNvPr>
+            <p:cNvSpPr txBox="1"/>
+            <p:nvPr/>
+          </p:nvSpPr>
+          <p:spPr>
+            <a:xfrm>
+              <a:off x="0" y="292780"/>
+              <a:ext cx="2257274" cy="238053"/>
+            </a:xfrm>
+            <a:prstGeom prst="rect">
+              <a:avLst/>
+            </a:prstGeom>
+          </p:spPr>
+          <p:txBody>
+            <a:bodyPr lIns="0" tIns="0" rIns="0" bIns="0" rtlCol="0" anchor="t">
+              <a:spAutoFit/>
+            </a:bodyPr>
+            <a:lstStyle/>
+            <a:p>
+              <a:pPr algn="ctr">
+                <a:lnSpc>
+                  <a:spcPts val="1564"/>
+                </a:lnSpc>
+              </a:pPr>
+              <a:r>
+                <a:rPr lang="en-US" sz="1043" spc="10" dirty="0">
+                  <a:solidFill>
+                    <a:srgbClr val="FFFFFF"/>
+                  </a:solidFill>
+                  <a:latin typeface="Montserrat Light Bold"/>
+                </a:rPr>
+                <a:t>Accuracy</a:t>
+              </a:r>
+            </a:p>
+          </p:txBody>
+        </p:sp>
+      </p:grpSp>
+      <p:sp>
+        <p:nvSpPr>
+          <p:cNvPr id="52" name="AutoShape 5">
+            <a:extLst>
+              <a:ext uri="{FF2B5EF4-FFF2-40B4-BE49-F238E27FC236}">
+                <a16:creationId xmlns:a16="http://schemas.microsoft.com/office/drawing/2014/main" id="{E5BAF021-7B96-2039-A74A-452B4FF80294}"/>
+              </a:ext>
+            </a:extLst>
+          </p:cNvPr>
+          <p:cNvSpPr/>
+          <p:nvPr/>
+        </p:nvSpPr>
+        <p:spPr>
+          <a:xfrm>
+            <a:off x="838200" y="3644797"/>
+            <a:ext cx="2091682" cy="803340"/>
+          </a:xfrm>
+          <a:prstGeom prst="rect">
+            <a:avLst/>
+          </a:prstGeom>
+          <a:solidFill>
+            <a:srgbClr val="5271FF"/>
+          </a:solidFill>
+        </p:spPr>
+        <p:txBody>
+          <a:bodyPr/>
+          <a:lstStyle/>
+          <a:p>
+            <a:endParaRPr lang="en-CA" dirty="0"/>
+          </a:p>
+        </p:txBody>
+      </p:sp>
+      <p:sp>
+        <p:nvSpPr>
+          <p:cNvPr id="53" name="AutoShape 7">
+            <a:extLst>
+              <a:ext uri="{FF2B5EF4-FFF2-40B4-BE49-F238E27FC236}">
+                <a16:creationId xmlns:a16="http://schemas.microsoft.com/office/drawing/2014/main" id="{47968B67-13BA-6251-3000-B798771FCCCF}"/>
+              </a:ext>
+            </a:extLst>
+          </p:cNvPr>
+          <p:cNvSpPr/>
+          <p:nvPr/>
+        </p:nvSpPr>
+        <p:spPr>
+          <a:xfrm>
+            <a:off x="842649" y="5441192"/>
+            <a:ext cx="2091682" cy="796860"/>
+          </a:xfrm>
+          <a:prstGeom prst="rect">
+            <a:avLst/>
+          </a:prstGeom>
+          <a:solidFill>
+            <a:srgbClr val="5271FF"/>
+          </a:solidFill>
+        </p:spPr>
+      </p:sp>
+      <p:grpSp>
+        <p:nvGrpSpPr>
+          <p:cNvPr id="54" name="Group 17">
+            <a:extLst>
+              <a:ext uri="{FF2B5EF4-FFF2-40B4-BE49-F238E27FC236}">
+                <a16:creationId xmlns:a16="http://schemas.microsoft.com/office/drawing/2014/main" id="{582F0C7F-B8DC-7158-EA7D-7682457E57C5}"/>
+              </a:ext>
+            </a:extLst>
+          </p:cNvPr>
+          <p:cNvGrpSpPr/>
+          <p:nvPr/>
+        </p:nvGrpSpPr>
+        <p:grpSpPr>
+          <a:xfrm>
+            <a:off x="1037564" y="3869751"/>
+            <a:ext cx="1692955" cy="390981"/>
+            <a:chOff x="0" y="9525"/>
+            <a:chExt cx="2257274" cy="521308"/>
+          </a:xfrm>
+        </p:grpSpPr>
+        <p:sp>
+          <p:nvSpPr>
+            <p:cNvPr id="55" name="TextBox 18">
+              <a:extLst>
+                <a:ext uri="{FF2B5EF4-FFF2-40B4-BE49-F238E27FC236}">
+                  <a16:creationId xmlns:a16="http://schemas.microsoft.com/office/drawing/2014/main" id="{AAFACC9A-79B7-17A5-1FD5-DE1AB36911D7}"/>
+                </a:ext>
+              </a:extLst>
+            </p:cNvPr>
+            <p:cNvSpPr txBox="1"/>
+            <p:nvPr/>
+          </p:nvSpPr>
+          <p:spPr>
+            <a:xfrm>
+              <a:off x="0" y="9525"/>
+              <a:ext cx="2257274" cy="307776"/>
+            </a:xfrm>
+            <a:prstGeom prst="rect">
+              <a:avLst/>
+            </a:prstGeom>
+          </p:spPr>
+          <p:txBody>
+            <a:bodyPr lIns="0" tIns="0" rIns="0" bIns="0" rtlCol="0" anchor="t">
+              <a:spAutoFit/>
+            </a:bodyPr>
+            <a:lstStyle/>
+            <a:p>
+              <a:pPr algn="ctr">
+                <a:lnSpc>
+                  <a:spcPts val="1785"/>
+                </a:lnSpc>
+              </a:pPr>
+              <a:r>
+                <a:rPr lang="en-US" sz="1487" dirty="0">
+                  <a:solidFill>
+                    <a:srgbClr val="FFFFFF"/>
+                  </a:solidFill>
+                  <a:latin typeface="League Spartan Bold"/>
+                </a:rPr>
+                <a:t>84.78%</a:t>
+              </a:r>
+            </a:p>
+          </p:txBody>
+        </p:sp>
+        <p:sp>
+          <p:nvSpPr>
+            <p:cNvPr id="56" name="TextBox 19">
+              <a:extLst>
+                <a:ext uri="{FF2B5EF4-FFF2-40B4-BE49-F238E27FC236}">
+                  <a16:creationId xmlns:a16="http://schemas.microsoft.com/office/drawing/2014/main" id="{675B6D38-E81A-C816-73C3-CC868968C165}"/>
+                </a:ext>
+              </a:extLst>
+            </p:cNvPr>
+            <p:cNvSpPr txBox="1"/>
+            <p:nvPr/>
+          </p:nvSpPr>
+          <p:spPr>
+            <a:xfrm>
+              <a:off x="0" y="292780"/>
+              <a:ext cx="2257274" cy="238053"/>
+            </a:xfrm>
+            <a:prstGeom prst="rect">
+              <a:avLst/>
+            </a:prstGeom>
+          </p:spPr>
+          <p:txBody>
+            <a:bodyPr lIns="0" tIns="0" rIns="0" bIns="0" rtlCol="0" anchor="t">
+              <a:spAutoFit/>
+            </a:bodyPr>
+            <a:lstStyle/>
+            <a:p>
+              <a:pPr algn="ctr">
+                <a:lnSpc>
+                  <a:spcPts val="1564"/>
+                </a:lnSpc>
+              </a:pPr>
+              <a:r>
+                <a:rPr lang="en-US" sz="1043" spc="10" dirty="0">
+                  <a:solidFill>
+                    <a:srgbClr val="FFFFFF"/>
+                  </a:solidFill>
+                  <a:latin typeface="Montserrat Light Bold"/>
+                </a:rPr>
+                <a:t>Accuracy</a:t>
+              </a:r>
+            </a:p>
+          </p:txBody>
+        </p:sp>
+      </p:grpSp>
+      <p:grpSp>
+        <p:nvGrpSpPr>
+          <p:cNvPr id="57" name="Group 20">
+            <a:extLst>
+              <a:ext uri="{FF2B5EF4-FFF2-40B4-BE49-F238E27FC236}">
+                <a16:creationId xmlns:a16="http://schemas.microsoft.com/office/drawing/2014/main" id="{3FC5C535-78E2-AA1E-B394-B9D63F324B1A}"/>
+              </a:ext>
+            </a:extLst>
+          </p:cNvPr>
+          <p:cNvGrpSpPr/>
+          <p:nvPr/>
+        </p:nvGrpSpPr>
+        <p:grpSpPr>
+          <a:xfrm>
+            <a:off x="1037564" y="4773515"/>
+            <a:ext cx="1692955" cy="390925"/>
+            <a:chOff x="0" y="9525"/>
+            <a:chExt cx="2257274" cy="521233"/>
+          </a:xfrm>
+        </p:grpSpPr>
+        <p:sp>
+          <p:nvSpPr>
+            <p:cNvPr id="58" name="TextBox 21">
+              <a:extLst>
+                <a:ext uri="{FF2B5EF4-FFF2-40B4-BE49-F238E27FC236}">
+                  <a16:creationId xmlns:a16="http://schemas.microsoft.com/office/drawing/2014/main" id="{B67D225C-ADCF-BB6A-58C1-393809229573}"/>
+                </a:ext>
+              </a:extLst>
+            </p:cNvPr>
+            <p:cNvSpPr txBox="1"/>
+            <p:nvPr/>
+          </p:nvSpPr>
+          <p:spPr>
+            <a:xfrm>
+              <a:off x="0" y="9525"/>
+              <a:ext cx="2257274" cy="307776"/>
+            </a:xfrm>
+            <a:prstGeom prst="rect">
+              <a:avLst/>
+            </a:prstGeom>
+          </p:spPr>
+          <p:txBody>
+            <a:bodyPr lIns="0" tIns="0" rIns="0" bIns="0" rtlCol="0" anchor="t">
+              <a:spAutoFit/>
+            </a:bodyPr>
+            <a:lstStyle/>
+            <a:p>
+              <a:pPr algn="ctr">
+                <a:lnSpc>
+                  <a:spcPts val="1785"/>
+                </a:lnSpc>
+              </a:pPr>
+              <a:r>
+                <a:rPr lang="en-US" sz="1487" dirty="0">
+                  <a:solidFill>
+                    <a:srgbClr val="FFFFFF"/>
+                  </a:solidFill>
+                  <a:latin typeface="League Spartan Bold"/>
+                </a:rPr>
+                <a:t>85.71%</a:t>
+              </a:r>
+            </a:p>
+          </p:txBody>
+        </p:sp>
+        <p:sp>
+          <p:nvSpPr>
+            <p:cNvPr id="59" name="TextBox 22">
+              <a:extLst>
+                <a:ext uri="{FF2B5EF4-FFF2-40B4-BE49-F238E27FC236}">
+                  <a16:creationId xmlns:a16="http://schemas.microsoft.com/office/drawing/2014/main" id="{84EF8008-DA41-A476-100D-2D5DAEE20DE1}"/>
+                </a:ext>
+              </a:extLst>
+            </p:cNvPr>
+            <p:cNvSpPr txBox="1"/>
+            <p:nvPr/>
+          </p:nvSpPr>
+          <p:spPr>
+            <a:xfrm>
+              <a:off x="0" y="292780"/>
+              <a:ext cx="2257274" cy="237978"/>
+            </a:xfrm>
+            <a:prstGeom prst="rect">
+              <a:avLst/>
+            </a:prstGeom>
+          </p:spPr>
+          <p:txBody>
+            <a:bodyPr lIns="0" tIns="0" rIns="0" bIns="0" rtlCol="0" anchor="t">
+              <a:spAutoFit/>
+            </a:bodyPr>
+            <a:lstStyle/>
+            <a:p>
+              <a:pPr algn="ctr">
+                <a:lnSpc>
+                  <a:spcPts val="1566"/>
+                </a:lnSpc>
+              </a:pPr>
+              <a:r>
+                <a:rPr lang="en-US" sz="1044" spc="10">
+                  <a:solidFill>
+                    <a:srgbClr val="FFFFFF"/>
+                  </a:solidFill>
+                  <a:latin typeface="Montserrat Light Bold"/>
+                </a:rPr>
+                <a:t>Precision</a:t>
+              </a:r>
+            </a:p>
+          </p:txBody>
+        </p:sp>
+      </p:grpSp>
+      <p:grpSp>
+        <p:nvGrpSpPr>
+          <p:cNvPr id="60" name="Group 23">
+            <a:extLst>
+              <a:ext uri="{FF2B5EF4-FFF2-40B4-BE49-F238E27FC236}">
+                <a16:creationId xmlns:a16="http://schemas.microsoft.com/office/drawing/2014/main" id="{8114EAF6-FC24-3545-EFA4-C9C7883E29F6}"/>
+              </a:ext>
+            </a:extLst>
+          </p:cNvPr>
+          <p:cNvGrpSpPr/>
+          <p:nvPr/>
+        </p:nvGrpSpPr>
+        <p:grpSpPr>
+          <a:xfrm>
+            <a:off x="1042013" y="5675149"/>
+            <a:ext cx="1692955" cy="390925"/>
+            <a:chOff x="0" y="9525"/>
+            <a:chExt cx="2257274" cy="521233"/>
+          </a:xfrm>
+        </p:grpSpPr>
+        <p:sp>
+          <p:nvSpPr>
+            <p:cNvPr id="61" name="TextBox 24">
+              <a:extLst>
+                <a:ext uri="{FF2B5EF4-FFF2-40B4-BE49-F238E27FC236}">
+                  <a16:creationId xmlns:a16="http://schemas.microsoft.com/office/drawing/2014/main" id="{671926D6-D212-8160-29BA-8BB280458D1D}"/>
+                </a:ext>
+              </a:extLst>
+            </p:cNvPr>
+            <p:cNvSpPr txBox="1"/>
+            <p:nvPr/>
+          </p:nvSpPr>
+          <p:spPr>
+            <a:xfrm>
+              <a:off x="0" y="9525"/>
+              <a:ext cx="2257274" cy="307776"/>
+            </a:xfrm>
+            <a:prstGeom prst="rect">
+              <a:avLst/>
+            </a:prstGeom>
+          </p:spPr>
+          <p:txBody>
+            <a:bodyPr lIns="0" tIns="0" rIns="0" bIns="0" rtlCol="0" anchor="t">
+              <a:spAutoFit/>
+            </a:bodyPr>
+            <a:lstStyle/>
+            <a:p>
+              <a:pPr algn="ctr">
+                <a:lnSpc>
+                  <a:spcPts val="1785"/>
+                </a:lnSpc>
+              </a:pPr>
+              <a:r>
+                <a:rPr lang="en-US" sz="1487" dirty="0">
+                  <a:solidFill>
+                    <a:srgbClr val="FFFFFF"/>
+                  </a:solidFill>
+                  <a:latin typeface="League Spartan Bold"/>
+                </a:rPr>
+                <a:t>87.79%</a:t>
+              </a:r>
+            </a:p>
+          </p:txBody>
+        </p:sp>
+        <p:sp>
+          <p:nvSpPr>
+            <p:cNvPr id="62" name="TextBox 25">
+              <a:extLst>
+                <a:ext uri="{FF2B5EF4-FFF2-40B4-BE49-F238E27FC236}">
+                  <a16:creationId xmlns:a16="http://schemas.microsoft.com/office/drawing/2014/main" id="{05DAC80F-9F91-F9A3-A87F-E668E03EF1C9}"/>
+                </a:ext>
+              </a:extLst>
+            </p:cNvPr>
+            <p:cNvSpPr txBox="1"/>
+            <p:nvPr/>
+          </p:nvSpPr>
+          <p:spPr>
+            <a:xfrm>
+              <a:off x="0" y="292780"/>
+              <a:ext cx="2257274" cy="237978"/>
+            </a:xfrm>
+            <a:prstGeom prst="rect">
+              <a:avLst/>
+            </a:prstGeom>
+          </p:spPr>
+          <p:txBody>
+            <a:bodyPr lIns="0" tIns="0" rIns="0" bIns="0" rtlCol="0" anchor="t">
+              <a:spAutoFit/>
+            </a:bodyPr>
+            <a:lstStyle/>
+            <a:p>
+              <a:pPr algn="ctr">
+                <a:lnSpc>
+                  <a:spcPts val="1566"/>
+                </a:lnSpc>
+              </a:pPr>
+              <a:r>
+                <a:rPr lang="en-US" sz="1044" spc="10">
+                  <a:solidFill>
+                    <a:srgbClr val="FFFFFF"/>
+                  </a:solidFill>
+                  <a:latin typeface="Montserrat Light Bold"/>
+                </a:rPr>
+                <a:t>Recall</a:t>
+              </a:r>
+            </a:p>
+          </p:txBody>
+        </p:sp>
+      </p:grpSp>
+      <p:sp>
+        <p:nvSpPr>
+          <p:cNvPr id="67" name="AutoShape 6">
+            <a:extLst>
+              <a:ext uri="{FF2B5EF4-FFF2-40B4-BE49-F238E27FC236}">
+                <a16:creationId xmlns:a16="http://schemas.microsoft.com/office/drawing/2014/main" id="{4BBDC6CD-5B04-B12A-0044-48CEDB3B5199}"/>
+              </a:ext>
+            </a:extLst>
+          </p:cNvPr>
+          <p:cNvSpPr/>
+          <p:nvPr/>
+        </p:nvSpPr>
+        <p:spPr>
+          <a:xfrm>
+            <a:off x="838201" y="4531643"/>
+            <a:ext cx="2091682" cy="799821"/>
+          </a:xfrm>
+          <a:prstGeom prst="rect">
+            <a:avLst/>
+          </a:prstGeom>
+          <a:solidFill>
+            <a:srgbClr val="5271FF"/>
+          </a:solidFill>
+        </p:spPr>
+      </p:sp>
+      <p:grpSp>
+        <p:nvGrpSpPr>
+          <p:cNvPr id="68" name="Group 20">
+            <a:extLst>
+              <a:ext uri="{FF2B5EF4-FFF2-40B4-BE49-F238E27FC236}">
+                <a16:creationId xmlns:a16="http://schemas.microsoft.com/office/drawing/2014/main" id="{299D51C9-3CB0-DCDD-7B13-B67ECE6DB9C5}"/>
+              </a:ext>
+            </a:extLst>
+          </p:cNvPr>
+          <p:cNvGrpSpPr/>
+          <p:nvPr/>
+        </p:nvGrpSpPr>
+        <p:grpSpPr>
+          <a:xfrm>
+            <a:off x="1037564" y="4764891"/>
+            <a:ext cx="1692955" cy="390925"/>
+            <a:chOff x="0" y="9525"/>
+            <a:chExt cx="2257274" cy="521233"/>
+          </a:xfrm>
+        </p:grpSpPr>
+        <p:sp>
+          <p:nvSpPr>
+            <p:cNvPr id="69" name="TextBox 21">
+              <a:extLst>
+                <a:ext uri="{FF2B5EF4-FFF2-40B4-BE49-F238E27FC236}">
+                  <a16:creationId xmlns:a16="http://schemas.microsoft.com/office/drawing/2014/main" id="{7B6EA490-5FD1-E262-37F2-82D8ED0E6636}"/>
+                </a:ext>
+              </a:extLst>
+            </p:cNvPr>
+            <p:cNvSpPr txBox="1"/>
+            <p:nvPr/>
+          </p:nvSpPr>
+          <p:spPr>
+            <a:xfrm>
+              <a:off x="0" y="9525"/>
+              <a:ext cx="2257274" cy="307776"/>
+            </a:xfrm>
+            <a:prstGeom prst="rect">
+              <a:avLst/>
+            </a:prstGeom>
+          </p:spPr>
+          <p:txBody>
+            <a:bodyPr lIns="0" tIns="0" rIns="0" bIns="0" rtlCol="0" anchor="t">
+              <a:spAutoFit/>
+            </a:bodyPr>
+            <a:lstStyle/>
+            <a:p>
+              <a:pPr algn="ctr">
+                <a:lnSpc>
+                  <a:spcPts val="1785"/>
+                </a:lnSpc>
+              </a:pPr>
+              <a:r>
+                <a:rPr lang="en-US" sz="1487" dirty="0">
+                  <a:solidFill>
+                    <a:srgbClr val="FFFFFF"/>
+                  </a:solidFill>
+                  <a:latin typeface="League Spartan Bold"/>
+                </a:rPr>
+                <a:t>85.82%</a:t>
+              </a:r>
+            </a:p>
+          </p:txBody>
+        </p:sp>
+        <p:sp>
+          <p:nvSpPr>
+            <p:cNvPr id="70" name="TextBox 22">
+              <a:extLst>
+                <a:ext uri="{FF2B5EF4-FFF2-40B4-BE49-F238E27FC236}">
+                  <a16:creationId xmlns:a16="http://schemas.microsoft.com/office/drawing/2014/main" id="{FCF1D405-1DBC-5D41-6C0F-D31B5D86C681}"/>
+                </a:ext>
+              </a:extLst>
+            </p:cNvPr>
+            <p:cNvSpPr txBox="1"/>
+            <p:nvPr/>
+          </p:nvSpPr>
+          <p:spPr>
+            <a:xfrm>
+              <a:off x="0" y="292780"/>
+              <a:ext cx="2257274" cy="237978"/>
+            </a:xfrm>
+            <a:prstGeom prst="rect">
+              <a:avLst/>
+            </a:prstGeom>
+          </p:spPr>
+          <p:txBody>
+            <a:bodyPr lIns="0" tIns="0" rIns="0" bIns="0" rtlCol="0" anchor="t">
+              <a:spAutoFit/>
+            </a:bodyPr>
+            <a:lstStyle/>
+            <a:p>
+              <a:pPr algn="ctr">
+                <a:lnSpc>
+                  <a:spcPts val="1566"/>
+                </a:lnSpc>
+              </a:pPr>
+              <a:r>
+                <a:rPr lang="en-US" sz="1044" spc="10">
+                  <a:solidFill>
+                    <a:srgbClr val="FFFFFF"/>
+                  </a:solidFill>
+                  <a:latin typeface="Montserrat Light Bold"/>
+                </a:rPr>
+                <a:t>Precision</a:t>
+              </a:r>
+            </a:p>
+          </p:txBody>
+        </p:sp>
+      </p:grpSp>
     </p:spTree>
   </p:cSld>
   <p:clrMapOvr>
@@ -6895,7 +7845,7 @@
                 </a:lnSpc>
               </a:pPr>
               <a:r>
-                <a:rPr lang="en-US" sz="1600">
+                <a:rPr lang="en-US" sz="1600" dirty="0">
                   <a:solidFill>
                     <a:srgbClr val="5271FF"/>
                   </a:solidFill>
@@ -6933,7 +7883,7 @@
                 </a:lnSpc>
               </a:pPr>
               <a:r>
-                <a:rPr lang="en-US" sz="1350" spc="13">
+                <a:rPr lang="en-US" sz="1350" spc="13" dirty="0">
                   <a:solidFill>
                     <a:srgbClr val="000000"/>
                   </a:solidFill>
@@ -6986,7 +7936,7 @@
                 </a:lnSpc>
               </a:pPr>
               <a:r>
-                <a:rPr lang="en-US" sz="1600">
+                <a:rPr lang="en-US" sz="1600" dirty="0">
                   <a:solidFill>
                     <a:srgbClr val="5271FF"/>
                   </a:solidFill>
@@ -7024,7 +7974,7 @@
                 </a:lnSpc>
               </a:pPr>
               <a:r>
-                <a:rPr lang="en-US" sz="1350" spc="13">
+                <a:rPr lang="en-US" sz="1350" spc="13" dirty="0">
                   <a:solidFill>
                     <a:srgbClr val="000000"/>
                   </a:solidFill>
@@ -7077,7 +8027,7 @@
                 </a:lnSpc>
               </a:pPr>
               <a:r>
-                <a:rPr lang="en-US" sz="1600">
+                <a:rPr lang="en-US" sz="1600" dirty="0">
                   <a:solidFill>
                     <a:srgbClr val="5271FF"/>
                   </a:solidFill>
@@ -7115,7 +8065,7 @@
                 </a:lnSpc>
               </a:pPr>
               <a:r>
-                <a:rPr lang="en-US" sz="1350" spc="13">
+                <a:rPr lang="en-US" sz="1350" spc="13" dirty="0">
                   <a:solidFill>
                     <a:srgbClr val="000000"/>
                   </a:solidFill>
@@ -7330,8 +8280,8 @@
         </p:nvSpPr>
         <p:spPr>
           <a:xfrm>
-            <a:off x="5874634" y="-923971"/>
-            <a:ext cx="7757932" cy="9163142"/>
+            <a:off x="7315200" y="-923971"/>
+            <a:ext cx="6317366" cy="9163142"/>
           </a:xfrm>
           <a:custGeom>
             <a:avLst/>
@@ -7383,10 +8333,10 @@
         </p:nvGrpSpPr>
         <p:grpSpPr>
           <a:xfrm>
-            <a:off x="731520" y="3076575"/>
-            <a:ext cx="4539127" cy="3531786"/>
+            <a:off x="457200" y="3076969"/>
+            <a:ext cx="7086600" cy="3622443"/>
             <a:chOff x="0" y="0"/>
-            <a:chExt cx="6052170" cy="4709048"/>
+            <a:chExt cx="6052170" cy="4829924"/>
           </a:xfrm>
         </p:grpSpPr>
         <p:sp>
@@ -7435,8 +8385,8 @@
           </p:nvSpPr>
           <p:spPr>
             <a:xfrm>
-              <a:off x="0" y="692038"/>
-              <a:ext cx="6052170" cy="4017010"/>
+              <a:off x="0" y="692039"/>
+              <a:ext cx="6052170" cy="4137885"/>
             </a:xfrm>
             <a:prstGeom prst="rect">
               <a:avLst/>
@@ -7454,13 +8404,22 @@
                 </a:lnSpc>
               </a:pPr>
               <a:r>
-                <a:rPr lang="en-US" sz="1749" spc="17">
+                <a:rPr lang="en-US" sz="1749" spc="17" dirty="0">
                   <a:solidFill>
                     <a:srgbClr val="000000"/>
                   </a:solidFill>
                   <a:latin typeface="Montserrat Light"/>
                 </a:rPr>
-                <a:t>Kaggle Dataset: https://www.kaggle.com/datasets/fedesoriano/heart-failure-prediction/</a:t>
+                <a:t>Kaggle Dataset: </a:t>
+              </a:r>
+              <a:r>
+                <a:rPr lang="en-US" sz="1400" spc="17" dirty="0">
+                  <a:solidFill>
+                    <a:srgbClr val="000000"/>
+                  </a:solidFill>
+                  <a:latin typeface="Montserrat Light"/>
+                </a:rPr>
+                <a:t>https://www.kaggle.com/datasets/fedesoriano/heart-failure-prediction/</a:t>
               </a:r>
             </a:p>
             <a:p>
@@ -7469,7 +8428,7 @@
                   <a:spcPts val="2624"/>
                 </a:lnSpc>
               </a:pPr>
-              <a:endParaRPr lang="en-US" sz="1749" spc="17">
+              <a:endParaRPr lang="en-US" sz="1749" spc="17" dirty="0">
                 <a:solidFill>
                   <a:srgbClr val="000000"/>
                 </a:solidFill>
@@ -7483,14 +8442,26 @@
                 </a:lnSpc>
               </a:pPr>
               <a:r>
-                <a:rPr lang="en-US" sz="1749" spc="17">
+                <a:rPr lang="en-US" sz="1749" spc="17" dirty="0">
                   <a:solidFill>
                     <a:srgbClr val="000000"/>
                   </a:solidFill>
                   <a:latin typeface="Montserrat Light"/>
                 </a:rPr>
-                <a:t>GitHub Repository: ____________________</a:t>
+                <a:t>GitHub Repository: </a:t>
               </a:r>
+              <a:r>
+                <a:rPr lang="en-CA" sz="1400" dirty="0">
+                  <a:latin typeface="Montserrat Light" panose="00000400000000000000" pitchFamily="2" charset="0"/>
+                </a:rPr>
+                <a:t>https://github.com/kaytlinwu/Capstone_Heart_Failure_Predictor</a:t>
+              </a:r>
+              <a:endParaRPr lang="en-US" sz="1600" spc="17" dirty="0">
+                <a:solidFill>
+                  <a:srgbClr val="000000"/>
+                </a:solidFill>
+                <a:latin typeface="Montserrat Light" panose="00000400000000000000" pitchFamily="2" charset="0"/>
+              </a:endParaRPr>
             </a:p>
             <a:p>
               <a:pPr>
@@ -7498,7 +8469,7 @@
                   <a:spcPts val="2324"/>
                 </a:lnSpc>
               </a:pPr>
-              <a:endParaRPr lang="en-US" sz="1749" spc="17">
+              <a:endParaRPr lang="en-US" sz="1749" spc="17" dirty="0">
                 <a:solidFill>
                   <a:srgbClr val="000000"/>
                 </a:solidFill>
@@ -7511,7 +8482,7 @@
                   <a:spcPts val="2324"/>
                 </a:lnSpc>
               </a:pPr>
-              <a:endParaRPr lang="en-US" sz="1749" spc="17">
+              <a:endParaRPr lang="en-US" sz="1749" spc="17" dirty="0">
                 <a:solidFill>
                   <a:srgbClr val="000000"/>
                 </a:solidFill>
@@ -7524,7 +8495,7 @@
                   <a:spcPts val="2025"/>
                 </a:lnSpc>
               </a:pPr>
-              <a:endParaRPr lang="en-US" sz="1749" spc="17">
+              <a:endParaRPr lang="en-US" sz="1749" spc="17" dirty="0">
                 <a:solidFill>
                   <a:srgbClr val="000000"/>
                 </a:solidFill>
@@ -7537,7 +8508,7 @@
                   <a:spcPts val="2025"/>
                 </a:lnSpc>
               </a:pPr>
-              <a:endParaRPr lang="en-US" sz="1749" spc="17">
+              <a:endParaRPr lang="en-US" sz="1749" spc="17" dirty="0">
                 <a:solidFill>
                   <a:srgbClr val="000000"/>
                 </a:solidFill>
@@ -7555,7 +8526,7 @@
         </p:nvGrpSpPr>
         <p:grpSpPr>
           <a:xfrm>
-            <a:off x="-563215" y="6845710"/>
+            <a:off x="-569565" y="6896715"/>
             <a:ext cx="10880029" cy="955012"/>
             <a:chOff x="0" y="0"/>
             <a:chExt cx="14506705" cy="1273349"/>
@@ -7908,4 +8879,299 @@
   <a:objectDefaults/>
   <a:extraClrSchemeLst/>
 </a:theme>
+</file>
+
+<file path=ppt/theme/theme2.xml><?xml version="1.0" encoding="utf-8"?>
+<a:theme xmlns:a="http://schemas.openxmlformats.org/drawingml/2006/main" name="Office Theme">
+  <a:themeElements>
+    <a:clrScheme name="Office">
+      <a:dk1>
+        <a:sysClr val="windowText" lastClr="000000"/>
+      </a:dk1>
+      <a:lt1>
+        <a:sysClr val="window" lastClr="FFFFFF"/>
+      </a:lt1>
+      <a:dk2>
+        <a:srgbClr val="44546A"/>
+      </a:dk2>
+      <a:lt2>
+        <a:srgbClr val="E7E6E6"/>
+      </a:lt2>
+      <a:accent1>
+        <a:srgbClr val="4472C4"/>
+      </a:accent1>
+      <a:accent2>
+        <a:srgbClr val="ED7D31"/>
+      </a:accent2>
+      <a:accent3>
+        <a:srgbClr val="A5A5A5"/>
+      </a:accent3>
+      <a:accent4>
+        <a:srgbClr val="FFC000"/>
+      </a:accent4>
+      <a:accent5>
+        <a:srgbClr val="5B9BD5"/>
+      </a:accent5>
+      <a:accent6>
+        <a:srgbClr val="70AD47"/>
+      </a:accent6>
+      <a:hlink>
+        <a:srgbClr val="0563C1"/>
+      </a:hlink>
+      <a:folHlink>
+        <a:srgbClr val="954F72"/>
+      </a:folHlink>
+    </a:clrScheme>
+    <a:fontScheme name="Office">
+      <a:majorFont>
+        <a:latin typeface="Calibri Light" panose="020F0302020204030204"/>
+        <a:ea typeface=""/>
+        <a:cs typeface=""/>
+        <a:font script="Jpan" typeface="游ゴシック Light"/>
+        <a:font script="Hang" typeface="맑은 고딕"/>
+        <a:font script="Hans" typeface="等线 Light"/>
+        <a:font script="Hant" typeface="新細明體"/>
+        <a:font script="Arab" typeface="Times New Roman"/>
+        <a:font script="Hebr" typeface="Times New Roman"/>
+        <a:font script="Thai" typeface="Angsana New"/>
+        <a:font script="Ethi" typeface="Nyala"/>
+        <a:font script="Beng" typeface="Vrinda"/>
+        <a:font script="Gujr" typeface="Shruti"/>
+        <a:font script="Khmr" typeface="MoolBoran"/>
+        <a:font script="Knda" typeface="Tunga"/>
+        <a:font script="Guru" typeface="Raavi"/>
+        <a:font script="Cans" typeface="Euphemia"/>
+        <a:font script="Cher" typeface="Plantagenet Cherokee"/>
+        <a:font script="Yiii" typeface="Microsoft Yi Baiti"/>
+        <a:font script="Tibt" typeface="Microsoft Himalaya"/>
+        <a:font script="Thaa" typeface="MV Boli"/>
+        <a:font script="Deva" typeface="Mangal"/>
+        <a:font script="Telu" typeface="Gautami"/>
+        <a:font script="Taml" typeface="Latha"/>
+        <a:font script="Syrc" typeface="Estrangelo Edessa"/>
+        <a:font script="Orya" typeface="Kalinga"/>
+        <a:font script="Mlym" typeface="Kartika"/>
+        <a:font script="Laoo" typeface="DokChampa"/>
+        <a:font script="Sinh" typeface="Iskoola Pota"/>
+        <a:font script="Mong" typeface="Mongolian Baiti"/>
+        <a:font script="Viet" typeface="Times New Roman"/>
+        <a:font script="Uigh" typeface="Microsoft Uighur"/>
+        <a:font script="Geor" typeface="Sylfaen"/>
+        <a:font script="Armn" typeface="Arial"/>
+        <a:font script="Bugi" typeface="Leelawadee UI"/>
+        <a:font script="Bopo" typeface="Microsoft JhengHei"/>
+        <a:font script="Java" typeface="Javanese Text"/>
+        <a:font script="Lisu" typeface="Segoe UI"/>
+        <a:font script="Mymr" typeface="Myanmar Text"/>
+        <a:font script="Nkoo" typeface="Ebrima"/>
+        <a:font script="Olck" typeface="Nirmala UI"/>
+        <a:font script="Osma" typeface="Ebrima"/>
+        <a:font script="Phag" typeface="Phagspa"/>
+        <a:font script="Syrn" typeface="Estrangelo Edessa"/>
+        <a:font script="Syrj" typeface="Estrangelo Edessa"/>
+        <a:font script="Syre" typeface="Estrangelo Edessa"/>
+        <a:font script="Sora" typeface="Nirmala UI"/>
+        <a:font script="Tale" typeface="Microsoft Tai Le"/>
+        <a:font script="Talu" typeface="Microsoft New Tai Lue"/>
+        <a:font script="Tfng" typeface="Ebrima"/>
+      </a:majorFont>
+      <a:minorFont>
+        <a:latin typeface="Calibri" panose="020F0502020204030204"/>
+        <a:ea typeface=""/>
+        <a:cs typeface=""/>
+        <a:font script="Jpan" typeface="游ゴシック"/>
+        <a:font script="Hang" typeface="맑은 고딕"/>
+        <a:font script="Hans" typeface="等线"/>
+        <a:font script="Hant" typeface="新細明體"/>
+        <a:font script="Arab" typeface="Arial"/>
+        <a:font script="Hebr" typeface="Arial"/>
+        <a:font script="Thai" typeface="Cordia New"/>
+        <a:font script="Ethi" typeface="Nyala"/>
+        <a:font script="Beng" typeface="Vrinda"/>
+        <a:font script="Gujr" typeface="Shruti"/>
+        <a:font script="Khmr" typeface="DaunPenh"/>
+        <a:font script="Knda" typeface="Tunga"/>
+        <a:font script="Guru" typeface="Raavi"/>
+        <a:font script="Cans" typeface="Euphemia"/>
+        <a:font script="Cher" typeface="Plantagenet Cherokee"/>
+        <a:font script="Yiii" typeface="Microsoft Yi Baiti"/>
+        <a:font script="Tibt" typeface="Microsoft Himalaya"/>
+        <a:font script="Thaa" typeface="MV Boli"/>
+        <a:font script="Deva" typeface="Mangal"/>
+        <a:font script="Telu" typeface="Gautami"/>
+        <a:font script="Taml" typeface="Latha"/>
+        <a:font script="Syrc" typeface="Estrangelo Edessa"/>
+        <a:font script="Orya" typeface="Kalinga"/>
+        <a:font script="Mlym" typeface="Kartika"/>
+        <a:font script="Laoo" typeface="DokChampa"/>
+        <a:font script="Sinh" typeface="Iskoola Pota"/>
+        <a:font script="Mong" typeface="Mongolian Baiti"/>
+        <a:font script="Viet" typeface="Arial"/>
+        <a:font script="Uigh" typeface="Microsoft Uighur"/>
+        <a:font script="Geor" typeface="Sylfaen"/>
+        <a:font script="Armn" typeface="Arial"/>
+        <a:font script="Bugi" typeface="Leelawadee UI"/>
+        <a:font script="Bopo" typeface="Microsoft JhengHei"/>
+        <a:font script="Java" typeface="Javanese Text"/>
+        <a:font script="Lisu" typeface="Segoe UI"/>
+        <a:font script="Mymr" typeface="Myanmar Text"/>
+        <a:font script="Nkoo" typeface="Ebrima"/>
+        <a:font script="Olck" typeface="Nirmala UI"/>
+        <a:font script="Osma" typeface="Ebrima"/>
+        <a:font script="Phag" typeface="Phagspa"/>
+        <a:font script="Syrn" typeface="Estrangelo Edessa"/>
+        <a:font script="Syrj" typeface="Estrangelo Edessa"/>
+        <a:font script="Syre" typeface="Estrangelo Edessa"/>
+        <a:font script="Sora" typeface="Nirmala UI"/>
+        <a:font script="Tale" typeface="Microsoft Tai Le"/>
+        <a:font script="Talu" typeface="Microsoft New Tai Lue"/>
+        <a:font script="Tfng" typeface="Ebrima"/>
+      </a:minorFont>
+    </a:fontScheme>
+    <a:fmtScheme name="Office">
+      <a:fillStyleLst>
+        <a:solidFill>
+          <a:schemeClr val="phClr"/>
+        </a:solidFill>
+        <a:gradFill rotWithShape="1">
+          <a:gsLst>
+            <a:gs pos="0">
+              <a:schemeClr val="phClr">
+                <a:lumMod val="110000"/>
+                <a:satMod val="105000"/>
+                <a:tint val="67000"/>
+              </a:schemeClr>
+            </a:gs>
+            <a:gs pos="50000">
+              <a:schemeClr val="phClr">
+                <a:lumMod val="105000"/>
+                <a:satMod val="103000"/>
+                <a:tint val="73000"/>
+              </a:schemeClr>
+            </a:gs>
+            <a:gs pos="100000">
+              <a:schemeClr val="phClr">
+                <a:lumMod val="105000"/>
+                <a:satMod val="109000"/>
+                <a:tint val="81000"/>
+              </a:schemeClr>
+            </a:gs>
+          </a:gsLst>
+          <a:lin ang="5400000" scaled="0"/>
+        </a:gradFill>
+        <a:gradFill rotWithShape="1">
+          <a:gsLst>
+            <a:gs pos="0">
+              <a:schemeClr val="phClr">
+                <a:satMod val="103000"/>
+                <a:lumMod val="102000"/>
+                <a:tint val="94000"/>
+              </a:schemeClr>
+            </a:gs>
+            <a:gs pos="50000">
+              <a:schemeClr val="phClr">
+                <a:satMod val="110000"/>
+                <a:lumMod val="100000"/>
+                <a:shade val="100000"/>
+              </a:schemeClr>
+            </a:gs>
+            <a:gs pos="100000">
+              <a:schemeClr val="phClr">
+                <a:lumMod val="99000"/>
+                <a:satMod val="120000"/>
+                <a:shade val="78000"/>
+              </a:schemeClr>
+            </a:gs>
+          </a:gsLst>
+          <a:lin ang="5400000" scaled="0"/>
+        </a:gradFill>
+      </a:fillStyleLst>
+      <a:lnStyleLst>
+        <a:ln w="6350" cap="flat" cmpd="sng" algn="ctr">
+          <a:solidFill>
+            <a:schemeClr val="phClr"/>
+          </a:solidFill>
+          <a:prstDash val="solid"/>
+          <a:miter lim="800000"/>
+        </a:ln>
+        <a:ln w="12700" cap="flat" cmpd="sng" algn="ctr">
+          <a:solidFill>
+            <a:schemeClr val="phClr"/>
+          </a:solidFill>
+          <a:prstDash val="solid"/>
+          <a:miter lim="800000"/>
+        </a:ln>
+        <a:ln w="19050" cap="flat" cmpd="sng" algn="ctr">
+          <a:solidFill>
+            <a:schemeClr val="phClr"/>
+          </a:solidFill>
+          <a:prstDash val="solid"/>
+          <a:miter lim="800000"/>
+        </a:ln>
+      </a:lnStyleLst>
+      <a:effectStyleLst>
+        <a:effectStyle>
+          <a:effectLst/>
+        </a:effectStyle>
+        <a:effectStyle>
+          <a:effectLst/>
+        </a:effectStyle>
+        <a:effectStyle>
+          <a:effectLst>
+            <a:outerShdw blurRad="57150" dist="19050" dir="5400000" algn="ctr" rotWithShape="0">
+              <a:srgbClr val="000000">
+                <a:alpha val="63000"/>
+              </a:srgbClr>
+            </a:outerShdw>
+          </a:effectLst>
+        </a:effectStyle>
+      </a:effectStyleLst>
+      <a:bgFillStyleLst>
+        <a:solidFill>
+          <a:schemeClr val="phClr"/>
+        </a:solidFill>
+        <a:solidFill>
+          <a:schemeClr val="phClr">
+            <a:tint val="95000"/>
+            <a:satMod val="170000"/>
+          </a:schemeClr>
+        </a:solidFill>
+        <a:gradFill rotWithShape="1">
+          <a:gsLst>
+            <a:gs pos="0">
+              <a:schemeClr val="phClr">
+                <a:tint val="93000"/>
+                <a:satMod val="150000"/>
+                <a:shade val="98000"/>
+                <a:lumMod val="102000"/>
+              </a:schemeClr>
+            </a:gs>
+            <a:gs pos="50000">
+              <a:schemeClr val="phClr">
+                <a:tint val="98000"/>
+                <a:satMod val="130000"/>
+                <a:shade val="90000"/>
+                <a:lumMod val="103000"/>
+              </a:schemeClr>
+            </a:gs>
+            <a:gs pos="100000">
+              <a:schemeClr val="phClr">
+                <a:shade val="63000"/>
+                <a:satMod val="120000"/>
+              </a:schemeClr>
+            </a:gs>
+          </a:gsLst>
+          <a:lin ang="5400000" scaled="0"/>
+        </a:gradFill>
+      </a:bgFillStyleLst>
+    </a:fmtScheme>
+  </a:themeElements>
+  <a:objectDefaults/>
+  <a:extraClrSchemeLst/>
+  <a:extLst>
+    <a:ext uri="{05A4C25C-085E-4340-85A3-A5531E510DB2}">
+      <thm15:themeFamily xmlns:thm15="http://schemas.microsoft.com/office/thememl/2012/main" name="Office Theme" id="{62F939B6-93AF-4DB8-9C6B-D6C7DFDC589F}" vid="{4A3C46E8-61CC-4603-A589-7422A47A8E4A}"/>
+    </a:ext>
+  </a:extLst>
+</a:theme>
 </file>
</xml_diff>